<commit_message>
Mapping by @ManyToOne from one table to another table.
</commit_message>
<xml_diff>
--- a/15_Ch32_Deployment.pptx
+++ b/15_Ch32_Deployment.pptx
@@ -5,10 +5,10 @@
     <p:sldMasterId id="2147483648" r:id="rId1"/>
   </p:sldMasterIdLst>
   <p:notesMasterIdLst>
-    <p:notesMasterId r:id="rId12"/>
+    <p:notesMasterId r:id="rId11"/>
   </p:notesMasterIdLst>
   <p:handoutMasterIdLst>
-    <p:handoutMasterId r:id="rId13"/>
+    <p:handoutMasterId r:id="rId12"/>
   </p:handoutMasterIdLst>
   <p:sldIdLst>
     <p:sldId id="256" r:id="rId2"/>
@@ -19,8 +19,7 @@
     <p:sldId id="266" r:id="rId7"/>
     <p:sldId id="269" r:id="rId8"/>
     <p:sldId id="271" r:id="rId9"/>
-    <p:sldId id="270" r:id="rId10"/>
-    <p:sldId id="259" r:id="rId11"/>
+    <p:sldId id="259" r:id="rId10"/>
   </p:sldIdLst>
   <p:sldSz cx="9144000" cy="6858000" type="screen4x3"/>
   <p:notesSz cx="6858000" cy="9144000"/>
@@ -3769,143 +3768,6 @@
 </p:sld>
 </file>
 
-<file path=ppt/slides/slide10.xml><?xml version="1.0" encoding="utf-8"?>
-<p:sld xmlns:a="http://schemas.openxmlformats.org/drawingml/2006/main" xmlns:r="http://schemas.openxmlformats.org/officeDocument/2006/relationships" xmlns:p="http://schemas.openxmlformats.org/presentationml/2006/main">
-  <p:cSld>
-    <p:spTree>
-      <p:nvGrpSpPr>
-        <p:cNvPr id="1" name=""/>
-        <p:cNvGrpSpPr/>
-        <p:nvPr/>
-      </p:nvGrpSpPr>
-      <p:grpSpPr>
-        <a:xfrm>
-          <a:off x="0" y="0"/>
-          <a:ext cx="0" cy="0"/>
-          <a:chOff x="0" y="0"/>
-          <a:chExt cx="0" cy="0"/>
-        </a:xfrm>
-      </p:grpSpPr>
-      <p:sp>
-        <p:nvSpPr>
-          <p:cNvPr id="2" name="標題 1"/>
-          <p:cNvSpPr>
-            <a:spLocks noGrp="1"/>
-          </p:cNvSpPr>
-          <p:nvPr>
-            <p:ph type="ctrTitle"/>
-          </p:nvPr>
-        </p:nvSpPr>
-        <p:spPr>
-          <a:xfrm>
-            <a:off x="0" y="2130425"/>
-            <a:ext cx="9144000" cy="1470025"/>
-          </a:xfrm>
-          <a:gradFill flip="none" rotWithShape="1">
-            <a:gsLst>
-              <a:gs pos="0">
-                <a:srgbClr val="00B0F0">
-                  <a:shade val="30000"/>
-                  <a:satMod val="115000"/>
-                </a:srgbClr>
-              </a:gs>
-              <a:gs pos="50000">
-                <a:srgbClr val="00B0F0">
-                  <a:shade val="67500"/>
-                  <a:satMod val="115000"/>
-                </a:srgbClr>
-              </a:gs>
-              <a:gs pos="100000">
-                <a:srgbClr val="00B0F0">
-                  <a:shade val="100000"/>
-                  <a:satMod val="115000"/>
-                </a:srgbClr>
-              </a:gs>
-            </a:gsLst>
-            <a:path path="circle">
-              <a:fillToRect t="100000" r="100000"/>
-            </a:path>
-            <a:tileRect l="-100000" b="-100000"/>
-          </a:gradFill>
-        </p:spPr>
-        <p:txBody>
-          <a:bodyPr>
-            <a:normAutofit/>
-          </a:bodyPr>
-          <a:lstStyle/>
-          <a:p>
-            <a:r>
-              <a:rPr lang="en-US" altLang="zh-TW" sz="6000" b="1" dirty="0">
-                <a:solidFill>
-                  <a:srgbClr val="FFFF00"/>
-                </a:solidFill>
-              </a:rPr>
-              <a:t>End of Chapter</a:t>
-            </a:r>
-            <a:endParaRPr lang="zh-TW" altLang="en-US" sz="6000" b="1" dirty="0">
-              <a:solidFill>
-                <a:srgbClr val="FFFF00"/>
-              </a:solidFill>
-            </a:endParaRPr>
-          </a:p>
-        </p:txBody>
-      </p:sp>
-      <p:sp>
-        <p:nvSpPr>
-          <p:cNvPr id="5" name="日期版面配置區 4"/>
-          <p:cNvSpPr>
-            <a:spLocks noGrp="1"/>
-          </p:cNvSpPr>
-          <p:nvPr>
-            <p:ph type="dt" sz="half" idx="10"/>
-          </p:nvPr>
-        </p:nvSpPr>
-        <p:spPr/>
-        <p:txBody>
-          <a:bodyPr/>
-          <a:lstStyle/>
-          <a:p>
-            <a:fld id="{4E46BE27-E923-4EC2-B046-3272AE2A3E5C}" type="datetime1">
-              <a:rPr lang="zh-TW" altLang="en-US" smtClean="0"/>
-              <a:pPr/>
-              <a:t>2018/12/17</a:t>
-            </a:fld>
-            <a:endParaRPr lang="zh-TW" altLang="en-US"/>
-          </a:p>
-        </p:txBody>
-      </p:sp>
-      <p:sp>
-        <p:nvSpPr>
-          <p:cNvPr id="6" name="投影片編號版面配置區 5"/>
-          <p:cNvSpPr>
-            <a:spLocks noGrp="1"/>
-          </p:cNvSpPr>
-          <p:nvPr>
-            <p:ph type="sldNum" sz="quarter" idx="12"/>
-          </p:nvPr>
-        </p:nvSpPr>
-        <p:spPr/>
-        <p:txBody>
-          <a:bodyPr/>
-          <a:lstStyle/>
-          <a:p>
-            <a:fld id="{E4D7E63D-91F2-4366-A2C4-1B00C9E2590E}" type="slidenum">
-              <a:rPr lang="zh-TW" altLang="en-US" smtClean="0"/>
-              <a:pPr/>
-              <a:t>10</a:t>
-            </a:fld>
-            <a:endParaRPr lang="zh-TW" altLang="en-US"/>
-          </a:p>
-        </p:txBody>
-      </p:sp>
-    </p:spTree>
-  </p:cSld>
-  <p:clrMapOvr>
-    <a:masterClrMapping/>
-  </p:clrMapOvr>
-</p:sld>
-</file>
-
 <file path=ppt/slides/slide2.xml><?xml version="1.0" encoding="utf-8"?>
 <p:sld xmlns:a="http://schemas.openxmlformats.org/drawingml/2006/main" xmlns:r="http://schemas.openxmlformats.org/officeDocument/2006/relationships" xmlns:p="http://schemas.openxmlformats.org/presentationml/2006/main">
   <p:cSld>
@@ -6499,7 +6361,7 @@
         </p:blipFill>
         <p:spPr>
           <a:xfrm>
-            <a:off x="899592" y="1865333"/>
+            <a:off x="971600" y="2354750"/>
             <a:ext cx="6304952" cy="2810170"/>
           </a:xfrm>
           <a:prstGeom prst="rect">
@@ -6587,8 +6449,8 @@
         </p:nvSpPr>
         <p:spPr>
           <a:xfrm>
-            <a:off x="395536" y="1412776"/>
-            <a:ext cx="8136904" cy="288032"/>
+            <a:off x="395536" y="1412775"/>
+            <a:ext cx="8136904" cy="673231"/>
           </a:xfrm>
           <a:ln>
             <a:solidFill>
@@ -6617,7 +6479,26 @@
                 </a:solidFill>
                 <a:latin typeface="+mj-lt"/>
               </a:rPr>
-              <a:t>Run the same process. Instead of jar file, we have war file at the same spot.</a:t>
+              <a:t>Run the same process. Instead of jar file, we have war file at the same spot</a:t>
+            </a:r>
+          </a:p>
+          <a:p>
+            <a:pPr marL="342900" indent="-342900" algn="l">
+              <a:buClr>
+                <a:srgbClr val="0070C0"/>
+              </a:buClr>
+              <a:buSzPct val="80000"/>
+              <a:buFont typeface="Wingdings" pitchFamily="2" charset="2"/>
+              <a:buChar char="u"/>
+            </a:pPr>
+            <a:r>
+              <a:rPr lang="en-US" altLang="zh-TW" sz="1600" b="1" dirty="0">
+                <a:solidFill>
+                  <a:schemeClr val="tx1"/>
+                </a:solidFill>
+                <a:latin typeface="+mj-lt"/>
+              </a:rPr>
+              <a:t>You can run war the same way as jar.</a:t>
             </a:r>
           </a:p>
         </p:txBody>
@@ -6751,7 +6632,7 @@
         </p:nvSpPr>
         <p:spPr>
           <a:xfrm>
-            <a:off x="1187624" y="2648652"/>
+            <a:off x="1259632" y="3138069"/>
             <a:ext cx="5112568" cy="195515"/>
           </a:xfrm>
           <a:prstGeom prst="rect">
@@ -6831,120 +6712,9 @@
         </p:nvSpPr>
         <p:spPr>
           <a:xfrm>
-            <a:off x="0" y="1"/>
-            <a:ext cx="9144000" cy="764704"/>
-          </a:xfrm>
-          <a:gradFill flip="none" rotWithShape="1">
-            <a:gsLst>
-              <a:gs pos="0">
-                <a:srgbClr val="C00000">
-                  <a:shade val="30000"/>
-                  <a:satMod val="115000"/>
-                </a:srgbClr>
-              </a:gs>
-              <a:gs pos="50000">
-                <a:srgbClr val="C00000">
-                  <a:shade val="67500"/>
-                  <a:satMod val="115000"/>
-                </a:srgbClr>
-              </a:gs>
-              <a:gs pos="100000">
-                <a:srgbClr val="C00000">
-                  <a:shade val="100000"/>
-                  <a:satMod val="115000"/>
-                </a:srgbClr>
-              </a:gs>
-            </a:gsLst>
-            <a:path path="circle">
-              <a:fillToRect t="100000" r="100000"/>
-            </a:path>
-            <a:tileRect l="-100000" b="-100000"/>
-          </a:gradFill>
-        </p:spPr>
-        <p:txBody>
-          <a:bodyPr/>
-          <a:lstStyle/>
-          <a:p>
-            <a:pPr algn="l"/>
-            <a:r>
-              <a:rPr lang="en-US" altLang="zh-TW" b="1" dirty="0">
-                <a:solidFill>
-                  <a:srgbClr val="FFFF00"/>
-                </a:solidFill>
-              </a:rPr>
-              <a:t>32 Deployment</a:t>
-            </a:r>
-            <a:endParaRPr lang="zh-TW" altLang="en-US" b="1" dirty="0">
-              <a:solidFill>
-                <a:srgbClr val="FFFF00"/>
-              </a:solidFill>
-            </a:endParaRPr>
-          </a:p>
-        </p:txBody>
-      </p:sp>
-      <p:sp>
-        <p:nvSpPr>
-          <p:cNvPr id="3" name="副標題 2"/>
-          <p:cNvSpPr>
-            <a:spLocks noGrp="1"/>
-          </p:cNvSpPr>
-          <p:nvPr>
-            <p:ph type="subTitle" idx="1"/>
-          </p:nvPr>
-        </p:nvSpPr>
-        <p:spPr>
-          <a:xfrm>
-            <a:off x="395536" y="1412776"/>
-            <a:ext cx="8136904" cy="288032"/>
-          </a:xfrm>
-          <a:ln>
-            <a:solidFill>
-              <a:srgbClr val="C00000"/>
-            </a:solidFill>
-          </a:ln>
-        </p:spPr>
-        <p:txBody>
-          <a:bodyPr>
-            <a:noAutofit/>
-          </a:bodyPr>
-          <a:lstStyle/>
-          <a:p>
-            <a:pPr marL="342900" indent="-342900" algn="l">
-              <a:buClr>
-                <a:srgbClr val="0070C0"/>
-              </a:buClr>
-              <a:buSzPct val="80000"/>
-              <a:buFont typeface="Wingdings" pitchFamily="2" charset="2"/>
-              <a:buChar char="u"/>
-            </a:pPr>
-            <a:r>
-              <a:rPr lang="en-US" altLang="zh-TW" sz="1600" b="1" dirty="0">
-                <a:solidFill>
-                  <a:schemeClr val="tx1"/>
-                </a:solidFill>
-                <a:latin typeface="+mj-lt"/>
-              </a:rPr>
-              <a:t>Run the same process. Instead of jar file, we have war file at the same spot.</a:t>
-            </a:r>
-          </a:p>
-        </p:txBody>
-      </p:sp>
-      <p:sp>
-        <p:nvSpPr>
-          <p:cNvPr id="4" name="標題 1"/>
-          <p:cNvSpPr txBox="1">
-            <a:spLocks/>
-          </p:cNvSpPr>
-          <p:nvPr/>
-        </p:nvSpPr>
-        <p:spPr>
-          <a:xfrm>
-            <a:off x="0" y="764704"/>
-            <a:ext cx="9144000" cy="398616"/>
-          </a:xfrm>
-          <a:prstGeom prst="rect">
-            <a:avLst/>
-          </a:prstGeom>
+            <a:off x="0" y="2130425"/>
+            <a:ext cx="9144000" cy="1470025"/>
+          </a:xfrm>
           <a:gradFill flip="none" rotWithShape="1">
             <a:gsLst>
               <a:gs pos="0">
@@ -6973,16 +6743,24 @@
           </a:gradFill>
         </p:spPr>
         <p:txBody>
-          <a:bodyPr vert="horz" lIns="91440" tIns="45720" rIns="91440" bIns="45720" rtlCol="0" anchor="ctr">
-            <a:normAutofit fontScale="92500"/>
+          <a:bodyPr>
+            <a:normAutofit/>
           </a:bodyPr>
           <a:lstStyle/>
           <a:p>
             <a:r>
-              <a:rPr lang="en-US" altLang="zh-TW" sz="1600" b="1" i="1"/>
-              <a:t>https://www.youtube.com/watch?v=E7_a-kB46LU&amp;list=PLqq-6Pq4lTTbx8p2oCgcAQGQyqN8XeA1x&amp;index=9</a:t>
-            </a:r>
-            <a:endParaRPr lang="en-US" altLang="zh-TW" sz="1600" b="1" i="1" dirty="0"/>
+              <a:rPr lang="en-US" altLang="zh-TW" sz="6000" b="1" dirty="0">
+                <a:solidFill>
+                  <a:srgbClr val="FFFF00"/>
+                </a:solidFill>
+              </a:rPr>
+              <a:t>End of Chapter</a:t>
+            </a:r>
+            <a:endParaRPr lang="zh-TW" altLang="en-US" sz="6000" b="1" dirty="0">
+              <a:solidFill>
+                <a:srgbClr val="FFFF00"/>
+              </a:solidFill>
+            </a:endParaRPr>
           </a:p>
         </p:txBody>
       </p:sp>
@@ -6996,17 +6774,12 @@
             <p:ph type="dt" sz="half" idx="10"/>
           </p:nvPr>
         </p:nvSpPr>
-        <p:spPr>
-          <a:xfrm>
-            <a:off x="457200" y="6356350"/>
-            <a:ext cx="2133600" cy="404246"/>
-          </a:xfrm>
-        </p:spPr>
+        <p:spPr/>
         <p:txBody>
           <a:bodyPr/>
           <a:lstStyle/>
           <a:p>
-            <a:fld id="{A4F910E6-8D00-4BAF-8C48-9688E0B449D3}" type="datetime1">
+            <a:fld id="{4E46BE27-E923-4EC2-B046-3272AE2A3E5C}" type="datetime1">
               <a:rPr lang="zh-TW" altLang="en-US" smtClean="0"/>
               <a:pPr/>
               <a:t>2018/12/17</a:t>
@@ -7025,12 +6798,7 @@
             <p:ph type="sldNum" sz="quarter" idx="12"/>
           </p:nvPr>
         </p:nvSpPr>
-        <p:spPr>
-          <a:xfrm>
-            <a:off x="6553200" y="6356350"/>
-            <a:ext cx="2133600" cy="404246"/>
-          </a:xfrm>
-        </p:spPr>
+        <p:spPr/>
         <p:txBody>
           <a:bodyPr/>
           <a:lstStyle/>
@@ -7044,64 +6812,7 @@
           </a:p>
         </p:txBody>
       </p:sp>
-      <p:sp>
-        <p:nvSpPr>
-          <p:cNvPr id="18" name="Rectangle 17">
-            <a:extLst>
-              <a:ext uri="{FF2B5EF4-FFF2-40B4-BE49-F238E27FC236}">
-                <a16:creationId xmlns:a16="http://schemas.microsoft.com/office/drawing/2014/main" id="{C78753BB-938A-4526-A6BF-E20AE2A9F3D2}"/>
-              </a:ext>
-            </a:extLst>
-          </p:cNvPr>
-          <p:cNvSpPr/>
-          <p:nvPr/>
-        </p:nvSpPr>
-        <p:spPr>
-          <a:xfrm>
-            <a:off x="1187624" y="2648652"/>
-            <a:ext cx="5112568" cy="195515"/>
-          </a:xfrm>
-          <a:prstGeom prst="rect">
-            <a:avLst/>
-          </a:prstGeom>
-          <a:noFill/>
-          <a:ln>
-            <a:solidFill>
-              <a:srgbClr val="C00000"/>
-            </a:solidFill>
-          </a:ln>
-        </p:spPr>
-        <p:style>
-          <a:lnRef idx="2">
-            <a:schemeClr val="accent1">
-              <a:shade val="50000"/>
-            </a:schemeClr>
-          </a:lnRef>
-          <a:fillRef idx="1">
-            <a:schemeClr val="accent1"/>
-          </a:fillRef>
-          <a:effectRef idx="0">
-            <a:schemeClr val="accent1"/>
-          </a:effectRef>
-          <a:fontRef idx="minor">
-            <a:schemeClr val="lt1"/>
-          </a:fontRef>
-        </p:style>
-        <p:txBody>
-          <a:bodyPr rtlCol="0" anchor="ctr"/>
-          <a:lstStyle/>
-          <a:p>
-            <a:pPr algn="ctr"/>
-            <a:endParaRPr lang="en-US"/>
-          </a:p>
-        </p:txBody>
-      </p:sp>
     </p:spTree>
-    <p:extLst>
-      <p:ext uri="{BB962C8B-B14F-4D97-AF65-F5344CB8AC3E}">
-        <p14:creationId xmlns:p14="http://schemas.microsoft.com/office/powerpoint/2010/main" val="2939010302"/>
-      </p:ext>
-    </p:extLst>
   </p:cSld>
   <p:clrMapOvr>
     <a:masterClrMapping/>

</xml_diff>